<commit_message>
Site updated: 2021-09-26 21:41:59
</commit_message>
<xml_diff>
--- a/img/blog.pptx
+++ b/img/blog.pptx
@@ -5,10 +5,10 @@
     <p:sldMasterId id="2147483648" r:id="rId1"/>
   </p:sldMasterIdLst>
   <p:notesMasterIdLst>
-    <p:notesMasterId r:id="rId10"/>
+    <p:notesMasterId r:id="rId19"/>
   </p:notesMasterIdLst>
   <p:handoutMasterIdLst>
-    <p:handoutMasterId r:id="rId11"/>
+    <p:handoutMasterId r:id="rId20"/>
   </p:handoutMasterIdLst>
   <p:sldIdLst>
     <p:sldId id="259" r:id="rId3"/>
@@ -18,6 +18,15 @@
     <p:sldId id="263" r:id="rId7"/>
     <p:sldId id="264" r:id="rId8"/>
     <p:sldId id="265" r:id="rId9"/>
+    <p:sldId id="266" r:id="rId10"/>
+    <p:sldId id="267" r:id="rId11"/>
+    <p:sldId id="268" r:id="rId12"/>
+    <p:sldId id="269" r:id="rId13"/>
+    <p:sldId id="270" r:id="rId14"/>
+    <p:sldId id="271" r:id="rId15"/>
+    <p:sldId id="272" r:id="rId16"/>
+    <p:sldId id="273" r:id="rId17"/>
+    <p:sldId id="274" r:id="rId18"/>
   </p:sldIdLst>
   <p:sldSz cx="12192000" cy="6858000"/>
   <p:notesSz cx="7103745" cy="10234295"/>
@@ -6468,6 +6477,268 @@
 </p:sld>
 </file>
 
+<file path=ppt/slides/slide10.xml><?xml version="1.0" encoding="utf-8"?>
+<p:sld xmlns:a="http://schemas.openxmlformats.org/drawingml/2006/main" xmlns:r="http://schemas.openxmlformats.org/officeDocument/2006/relationships" xmlns:p="http://schemas.openxmlformats.org/presentationml/2006/main">
+  <p:cSld>
+    <p:spTree>
+      <p:nvGrpSpPr>
+        <p:cNvPr id="1" name=""/>
+        <p:cNvGrpSpPr/>
+        <p:nvPr/>
+      </p:nvGrpSpPr>
+      <p:grpSpPr/>
+      <p:pic>
+        <p:nvPicPr>
+          <p:cNvPr id="2" name="Picture 1"/>
+          <p:cNvPicPr>
+            <a:picLocks noChangeAspect="true"/>
+          </p:cNvPicPr>
+          <p:nvPr/>
+        </p:nvPicPr>
+        <p:blipFill>
+          <a:blip r:embed="rId1"/>
+          <a:stretch>
+            <a:fillRect/>
+          </a:stretch>
+        </p:blipFill>
+        <p:spPr>
+          <a:xfrm>
+            <a:off x="1866900" y="1512570"/>
+            <a:ext cx="8458200" cy="3832860"/>
+          </a:xfrm>
+          <a:prstGeom prst="rect">
+            <a:avLst/>
+          </a:prstGeom>
+        </p:spPr>
+      </p:pic>
+      <p:grpSp>
+        <p:nvGrpSpPr>
+          <p:cNvPr id="9" name="Group 8"/>
+          <p:cNvGrpSpPr/>
+          <p:nvPr/>
+        </p:nvGrpSpPr>
+        <p:grpSpPr>
+          <a:xfrm>
+            <a:off x="1229995" y="1725295"/>
+            <a:ext cx="636270" cy="2592070"/>
+            <a:chOff x="1937" y="2717"/>
+            <a:chExt cx="1002" cy="4082"/>
+          </a:xfrm>
+        </p:grpSpPr>
+        <p:sp>
+          <p:nvSpPr>
+            <p:cNvPr id="7" name="Curved Right Arrow 6"/>
+            <p:cNvSpPr/>
+            <p:nvPr/>
+          </p:nvSpPr>
+          <p:spPr>
+            <a:xfrm>
+              <a:off x="1937" y="2717"/>
+              <a:ext cx="1003" cy="4083"/>
+            </a:xfrm>
+            <a:prstGeom prst="curvedRightArrow">
+              <a:avLst/>
+            </a:prstGeom>
+          </p:spPr>
+          <p:style>
+            <a:lnRef idx="2">
+              <a:schemeClr val="accent1">
+                <a:shade val="50000"/>
+              </a:schemeClr>
+            </a:lnRef>
+            <a:fillRef idx="1">
+              <a:schemeClr val="accent1"/>
+            </a:fillRef>
+            <a:effectRef idx="0">
+              <a:schemeClr val="accent1"/>
+            </a:effectRef>
+            <a:fontRef idx="minor">
+              <a:schemeClr val="lt1"/>
+            </a:fontRef>
+          </p:style>
+          <p:txBody>
+            <a:bodyPr rtlCol="0" anchor="ctr"/>
+            <a:p>
+              <a:pPr algn="ctr"/>
+              <a:endParaRPr lang="en-US">
+                <a:solidFill>
+                  <a:schemeClr val="tx1"/>
+                </a:solidFill>
+              </a:endParaRPr>
+            </a:p>
+          </p:txBody>
+        </p:sp>
+        <p:sp>
+          <p:nvSpPr>
+            <p:cNvPr id="8" name="Text Box 7"/>
+            <p:cNvSpPr txBox="true"/>
+            <p:nvPr/>
+          </p:nvSpPr>
+          <p:spPr>
+            <a:xfrm rot="16200000">
+              <a:off x="735" y="4468"/>
+              <a:ext cx="3626" cy="483"/>
+            </a:xfrm>
+            <a:prstGeom prst="rect">
+              <a:avLst/>
+            </a:prstGeom>
+            <a:noFill/>
+          </p:spPr>
+          <p:txBody>
+            <a:bodyPr wrap="square" rtlCol="0">
+              <a:spAutoFit/>
+            </a:bodyPr>
+            <a:p>
+              <a:pPr algn="ctr"/>
+              <a:r>
+                <a:rPr lang="en-US" sz="1400" b="1"/>
+                <a:t>AssignGTbox2Anchor</a:t>
+              </a:r>
+              <a:endParaRPr lang="en-US" sz="1400" b="1"/>
+            </a:p>
+          </p:txBody>
+        </p:sp>
+      </p:grpSp>
+    </p:spTree>
+  </p:cSld>
+  <p:clrMapOvr>
+    <a:masterClrMapping/>
+  </p:clrMapOvr>
+</p:sld>
+</file>
+
+<file path=ppt/slides/slide11.xml><?xml version="1.0" encoding="utf-8"?>
+<p:sld xmlns:a="http://schemas.openxmlformats.org/drawingml/2006/main" xmlns:r="http://schemas.openxmlformats.org/officeDocument/2006/relationships" xmlns:p="http://schemas.openxmlformats.org/presentationml/2006/main">
+  <p:cSld>
+    <p:spTree>
+      <p:nvGrpSpPr>
+        <p:cNvPr id="1" name=""/>
+        <p:cNvGrpSpPr/>
+        <p:nvPr/>
+      </p:nvGrpSpPr>
+      <p:grpSpPr/>
+      <p:pic>
+        <p:nvPicPr>
+          <p:cNvPr id="2" name="Picture 1"/>
+          <p:cNvPicPr>
+            <a:picLocks noChangeAspect="true"/>
+          </p:cNvPicPr>
+          <p:nvPr/>
+        </p:nvPicPr>
+        <p:blipFill>
+          <a:blip r:embed="rId1"/>
+          <a:stretch>
+            <a:fillRect/>
+          </a:stretch>
+        </p:blipFill>
+        <p:spPr>
+          <a:xfrm>
+            <a:off x="2823210" y="1341755"/>
+            <a:ext cx="6544945" cy="4380865"/>
+          </a:xfrm>
+          <a:prstGeom prst="rect">
+            <a:avLst/>
+          </a:prstGeom>
+        </p:spPr>
+      </p:pic>
+    </p:spTree>
+  </p:cSld>
+  <p:clrMapOvr>
+    <a:masterClrMapping/>
+  </p:clrMapOvr>
+</p:sld>
+</file>
+
+<file path=ppt/slides/slide12.xml><?xml version="1.0" encoding="utf-8"?>
+<p:sld xmlns:a="http://schemas.openxmlformats.org/drawingml/2006/main" xmlns:r="http://schemas.openxmlformats.org/officeDocument/2006/relationships" xmlns:p="http://schemas.openxmlformats.org/presentationml/2006/main">
+  <p:cSld>
+    <p:spTree>
+      <p:nvGrpSpPr>
+        <p:cNvPr id="1" name=""/>
+        <p:cNvGrpSpPr/>
+        <p:nvPr/>
+      </p:nvGrpSpPr>
+      <p:grpSpPr/>
+    </p:spTree>
+  </p:cSld>
+  <p:clrMapOvr>
+    <a:masterClrMapping/>
+  </p:clrMapOvr>
+</p:sld>
+</file>
+
+<file path=ppt/slides/slide13.xml><?xml version="1.0" encoding="utf-8"?>
+<p:sld xmlns:a="http://schemas.openxmlformats.org/drawingml/2006/main" xmlns:r="http://schemas.openxmlformats.org/officeDocument/2006/relationships" xmlns:p="http://schemas.openxmlformats.org/presentationml/2006/main">
+  <p:cSld>
+    <p:spTree>
+      <p:nvGrpSpPr>
+        <p:cNvPr id="1" name=""/>
+        <p:cNvGrpSpPr/>
+        <p:nvPr/>
+      </p:nvGrpSpPr>
+      <p:grpSpPr/>
+    </p:spTree>
+  </p:cSld>
+  <p:clrMapOvr>
+    <a:masterClrMapping/>
+  </p:clrMapOvr>
+</p:sld>
+</file>
+
+<file path=ppt/slides/slide14.xml><?xml version="1.0" encoding="utf-8"?>
+<p:sld xmlns:a="http://schemas.openxmlformats.org/drawingml/2006/main" xmlns:r="http://schemas.openxmlformats.org/officeDocument/2006/relationships" xmlns:p="http://schemas.openxmlformats.org/presentationml/2006/main">
+  <p:cSld>
+    <p:spTree>
+      <p:nvGrpSpPr>
+        <p:cNvPr id="1" name=""/>
+        <p:cNvGrpSpPr/>
+        <p:nvPr/>
+      </p:nvGrpSpPr>
+      <p:grpSpPr/>
+    </p:spTree>
+  </p:cSld>
+  <p:clrMapOvr>
+    <a:masterClrMapping/>
+  </p:clrMapOvr>
+</p:sld>
+</file>
+
+<file path=ppt/slides/slide15.xml><?xml version="1.0" encoding="utf-8"?>
+<p:sld xmlns:a="http://schemas.openxmlformats.org/drawingml/2006/main" xmlns:r="http://schemas.openxmlformats.org/officeDocument/2006/relationships" xmlns:p="http://schemas.openxmlformats.org/presentationml/2006/main">
+  <p:cSld>
+    <p:spTree>
+      <p:nvGrpSpPr>
+        <p:cNvPr id="1" name=""/>
+        <p:cNvGrpSpPr/>
+        <p:nvPr/>
+      </p:nvGrpSpPr>
+      <p:grpSpPr/>
+    </p:spTree>
+  </p:cSld>
+  <p:clrMapOvr>
+    <a:masterClrMapping/>
+  </p:clrMapOvr>
+</p:sld>
+</file>
+
+<file path=ppt/slides/slide16.xml><?xml version="1.0" encoding="utf-8"?>
+<p:sld xmlns:a="http://schemas.openxmlformats.org/drawingml/2006/main" xmlns:r="http://schemas.openxmlformats.org/officeDocument/2006/relationships" xmlns:p="http://schemas.openxmlformats.org/presentationml/2006/main">
+  <p:cSld>
+    <p:spTree>
+      <p:nvGrpSpPr>
+        <p:cNvPr id="1" name=""/>
+        <p:cNvGrpSpPr/>
+        <p:nvPr/>
+      </p:nvGrpSpPr>
+      <p:grpSpPr/>
+    </p:spTree>
+  </p:cSld>
+  <p:clrMapOvr>
+    <a:masterClrMapping/>
+  </p:clrMapOvr>
+</p:sld>
+</file>
+
 <file path=ppt/slides/slide2.xml><?xml version="1.0" encoding="utf-8"?>
 <p:sld xmlns:a="http://schemas.openxmlformats.org/drawingml/2006/main" xmlns:r="http://schemas.openxmlformats.org/officeDocument/2006/relationships" xmlns:p="http://schemas.openxmlformats.org/presentationml/2006/main">
   <p:cSld>
@@ -9902,7 +10173,6 @@
           <a:p>
             <a:r>
               <a:rPr lang="en-US">
-                <a:ln/>
                 <a:solidFill>
                   <a:schemeClr val="accent1"/>
                 </a:solidFill>
@@ -9917,7 +10187,6 @@
               <a:t>······</a:t>
             </a:r>
             <a:endParaRPr lang="en-US">
-              <a:ln/>
               <a:solidFill>
                 <a:schemeClr val="accent1"/>
               </a:solidFill>
@@ -9987,6 +10256,238 @@
           </a:p>
         </p:txBody>
       </p:sp>
+    </p:spTree>
+  </p:cSld>
+  <p:clrMapOvr>
+    <a:masterClrMapping/>
+  </p:clrMapOvr>
+</p:sld>
+</file>
+
+<file path=ppt/slides/slide8.xml><?xml version="1.0" encoding="utf-8"?>
+<p:sld xmlns:a="http://schemas.openxmlformats.org/drawingml/2006/main" xmlns:r="http://schemas.openxmlformats.org/officeDocument/2006/relationships" xmlns:p="http://schemas.openxmlformats.org/presentationml/2006/main">
+  <p:cSld>
+    <p:spTree>
+      <p:nvGrpSpPr>
+        <p:cNvPr id="1" name=""/>
+        <p:cNvGrpSpPr/>
+        <p:nvPr/>
+      </p:nvGrpSpPr>
+      <p:grpSpPr/>
+      <p:grpSp>
+        <p:nvGrpSpPr>
+          <p:cNvPr id="20" name="Group 19"/>
+          <p:cNvGrpSpPr/>
+          <p:nvPr/>
+        </p:nvGrpSpPr>
+        <p:grpSpPr>
+          <a:xfrm>
+            <a:off x="715645" y="1605280"/>
+            <a:ext cx="10759440" cy="3646170"/>
+            <a:chOff x="1127" y="2528"/>
+            <a:chExt cx="16944" cy="5742"/>
+          </a:xfrm>
+        </p:grpSpPr>
+        <p:pic>
+          <p:nvPicPr>
+            <p:cNvPr id="3" name="Picture 2"/>
+            <p:cNvPicPr>
+              <a:picLocks noChangeAspect="true"/>
+            </p:cNvPicPr>
+            <p:nvPr/>
+          </p:nvPicPr>
+          <p:blipFill>
+            <a:blip r:embed="rId1"/>
+            <a:stretch>
+              <a:fillRect/>
+            </a:stretch>
+          </p:blipFill>
+          <p:spPr>
+            <a:xfrm>
+              <a:off x="1127" y="2528"/>
+              <a:ext cx="16945" cy="5743"/>
+            </a:xfrm>
+            <a:prstGeom prst="rect">
+              <a:avLst/>
+            </a:prstGeom>
+          </p:spPr>
+        </p:pic>
+        <p:sp>
+          <p:nvSpPr>
+            <p:cNvPr id="18" name="Rectangle 17"/>
+            <p:cNvSpPr/>
+            <p:nvPr/>
+          </p:nvSpPr>
+          <p:spPr>
+            <a:xfrm>
+              <a:off x="7934" y="5194"/>
+              <a:ext cx="555" cy="390"/>
+            </a:xfrm>
+            <a:prstGeom prst="rect">
+              <a:avLst/>
+            </a:prstGeom>
+            <a:solidFill>
+              <a:schemeClr val="bg1"/>
+            </a:solidFill>
+            <a:ln>
+              <a:noFill/>
+            </a:ln>
+          </p:spPr>
+          <p:style>
+            <a:lnRef idx="2">
+              <a:schemeClr val="accent1">
+                <a:shade val="50000"/>
+              </a:schemeClr>
+            </a:lnRef>
+            <a:fillRef idx="1">
+              <a:schemeClr val="accent1"/>
+            </a:fillRef>
+            <a:effectRef idx="0">
+              <a:schemeClr val="accent1"/>
+            </a:effectRef>
+            <a:fontRef idx="minor">
+              <a:schemeClr val="lt1"/>
+            </a:fontRef>
+          </p:style>
+          <p:txBody>
+            <a:bodyPr rtlCol="0" anchor="ctr"/>
+            <a:p>
+              <a:pPr algn="ctr"/>
+              <a:endParaRPr lang="en-US"/>
+            </a:p>
+          </p:txBody>
+        </p:sp>
+      </p:grpSp>
+    </p:spTree>
+  </p:cSld>
+  <p:clrMapOvr>
+    <a:masterClrMapping/>
+  </p:clrMapOvr>
+</p:sld>
+</file>
+
+<file path=ppt/slides/slide9.xml><?xml version="1.0" encoding="utf-8"?>
+<p:sld xmlns:a="http://schemas.openxmlformats.org/drawingml/2006/main" xmlns:r="http://schemas.openxmlformats.org/officeDocument/2006/relationships" xmlns:p="http://schemas.openxmlformats.org/presentationml/2006/main">
+  <p:cSld>
+    <p:spTree>
+      <p:nvGrpSpPr>
+        <p:cNvPr id="1" name=""/>
+        <p:cNvGrpSpPr/>
+        <p:nvPr/>
+      </p:nvGrpSpPr>
+      <p:grpSpPr/>
+      <p:pic>
+        <p:nvPicPr>
+          <p:cNvPr id="5" name="Picture 4"/>
+          <p:cNvPicPr>
+            <a:picLocks noChangeAspect="true"/>
+          </p:cNvPicPr>
+          <p:nvPr/>
+        </p:nvPicPr>
+        <p:blipFill>
+          <a:blip r:embed="rId1"/>
+          <a:stretch>
+            <a:fillRect/>
+          </a:stretch>
+        </p:blipFill>
+        <p:spPr>
+          <a:xfrm>
+            <a:off x="1866900" y="1512570"/>
+            <a:ext cx="8458200" cy="3832860"/>
+          </a:xfrm>
+          <a:prstGeom prst="rect">
+            <a:avLst/>
+          </a:prstGeom>
+        </p:spPr>
+      </p:pic>
+      <p:grpSp>
+        <p:nvGrpSpPr>
+          <p:cNvPr id="9" name="Group 8"/>
+          <p:cNvGrpSpPr/>
+          <p:nvPr/>
+        </p:nvGrpSpPr>
+        <p:grpSpPr>
+          <a:xfrm>
+            <a:off x="1229995" y="1725295"/>
+            <a:ext cx="636270" cy="2592070"/>
+            <a:chOff x="1937" y="2717"/>
+            <a:chExt cx="1002" cy="4082"/>
+          </a:xfrm>
+        </p:grpSpPr>
+        <p:sp>
+          <p:nvSpPr>
+            <p:cNvPr id="7" name="Curved Right Arrow 6"/>
+            <p:cNvSpPr/>
+            <p:nvPr/>
+          </p:nvSpPr>
+          <p:spPr>
+            <a:xfrm>
+              <a:off x="1937" y="2717"/>
+              <a:ext cx="1003" cy="4083"/>
+            </a:xfrm>
+            <a:prstGeom prst="curvedRightArrow">
+              <a:avLst/>
+            </a:prstGeom>
+          </p:spPr>
+          <p:style>
+            <a:lnRef idx="2">
+              <a:schemeClr val="accent1">
+                <a:shade val="50000"/>
+              </a:schemeClr>
+            </a:lnRef>
+            <a:fillRef idx="1">
+              <a:schemeClr val="accent1"/>
+            </a:fillRef>
+            <a:effectRef idx="0">
+              <a:schemeClr val="accent1"/>
+            </a:effectRef>
+            <a:fontRef idx="minor">
+              <a:schemeClr val="lt1"/>
+            </a:fontRef>
+          </p:style>
+          <p:txBody>
+            <a:bodyPr rtlCol="0" anchor="ctr"/>
+            <a:p>
+              <a:pPr algn="ctr"/>
+              <a:endParaRPr lang="en-US">
+                <a:solidFill>
+                  <a:schemeClr val="tx1"/>
+                </a:solidFill>
+              </a:endParaRPr>
+            </a:p>
+          </p:txBody>
+        </p:sp>
+        <p:sp>
+          <p:nvSpPr>
+            <p:cNvPr id="8" name="Text Box 7"/>
+            <p:cNvSpPr txBox="true"/>
+            <p:nvPr/>
+          </p:nvSpPr>
+          <p:spPr>
+            <a:xfrm rot="16200000">
+              <a:off x="735" y="4468"/>
+              <a:ext cx="3626" cy="483"/>
+            </a:xfrm>
+            <a:prstGeom prst="rect">
+              <a:avLst/>
+            </a:prstGeom>
+            <a:noFill/>
+          </p:spPr>
+          <p:txBody>
+            <a:bodyPr wrap="square" rtlCol="0">
+              <a:spAutoFit/>
+            </a:bodyPr>
+            <a:p>
+              <a:pPr algn="ctr"/>
+              <a:r>
+                <a:rPr lang="en-US" sz="1400" b="1"/>
+                <a:t>AssignGTbox2Anchor</a:t>
+              </a:r>
+              <a:endParaRPr lang="en-US" sz="1400" b="1"/>
+            </a:p>
+          </p:txBody>
+        </p:sp>
+      </p:grpSp>
     </p:spTree>
   </p:cSld>
   <p:clrMapOvr>

</xml_diff>

<commit_message>
Site updated: 2021-10-03 23:52:16
</commit_message>
<xml_diff>
--- a/img/blog.pptx
+++ b/img/blog.pptx
@@ -6659,6 +6659,30 @@
         <p:nvPr/>
       </p:nvGrpSpPr>
       <p:grpSpPr/>
+      <p:pic>
+        <p:nvPicPr>
+          <p:cNvPr id="8" name="Picture 7"/>
+          <p:cNvPicPr>
+            <a:picLocks noChangeAspect="true"/>
+          </p:cNvPicPr>
+          <p:nvPr/>
+        </p:nvPicPr>
+        <p:blipFill>
+          <a:blip r:embed="rId1"/>
+          <a:stretch>
+            <a:fillRect/>
+          </a:stretch>
+        </p:blipFill>
+        <p:spPr>
+          <a:xfrm>
+            <a:off x="1309370" y="1967865"/>
+            <a:ext cx="10017760" cy="666750"/>
+          </a:xfrm>
+          <a:prstGeom prst="rect">
+            <a:avLst/>
+          </a:prstGeom>
+        </p:spPr>
+      </p:pic>
     </p:spTree>
   </p:cSld>
   <p:clrMapOvr>

</xml_diff>

<commit_message>
Site updated: 2021-11-08 22:09:47
</commit_message>
<xml_diff>
--- a/img/blog.pptx
+++ b/img/blog.pptx
@@ -17437,6 +17437,30 @@
         <p:nvPr/>
       </p:nvGrpSpPr>
       <p:grpSpPr/>
+      <p:pic>
+        <p:nvPicPr>
+          <p:cNvPr id="2" name="Picture 1"/>
+          <p:cNvPicPr>
+            <a:picLocks noChangeAspect="true"/>
+          </p:cNvPicPr>
+          <p:nvPr/>
+        </p:nvPicPr>
+        <p:blipFill>
+          <a:blip r:embed="rId1"/>
+          <a:stretch>
+            <a:fillRect/>
+          </a:stretch>
+        </p:blipFill>
+        <p:spPr>
+          <a:xfrm>
+            <a:off x="473710" y="826135"/>
+            <a:ext cx="11555730" cy="5007610"/>
+          </a:xfrm>
+          <a:prstGeom prst="rect">
+            <a:avLst/>
+          </a:prstGeom>
+        </p:spPr>
+      </p:pic>
     </p:spTree>
   </p:cSld>
   <p:clrMapOvr>
@@ -17455,6 +17479,820 @@
         <p:nvPr/>
       </p:nvGrpSpPr>
       <p:grpSpPr/>
+      <p:grpSp>
+        <p:nvGrpSpPr>
+          <p:cNvPr id="8" name="Group 7"/>
+          <p:cNvGrpSpPr/>
+          <p:nvPr/>
+        </p:nvGrpSpPr>
+        <p:grpSpPr>
+          <a:xfrm>
+            <a:off x="5260340" y="1344295"/>
+            <a:ext cx="1000760" cy="1011555"/>
+            <a:chOff x="2519" y="2152"/>
+            <a:chExt cx="1576" cy="1593"/>
+          </a:xfrm>
+        </p:grpSpPr>
+        <p:sp>
+          <p:nvSpPr>
+            <p:cNvPr id="2" name="Oval 1"/>
+            <p:cNvSpPr/>
+            <p:nvPr/>
+          </p:nvSpPr>
+          <p:spPr>
+            <a:xfrm>
+              <a:off x="2519" y="2152"/>
+              <a:ext cx="1576" cy="1593"/>
+            </a:xfrm>
+            <a:prstGeom prst="ellipse">
+              <a:avLst/>
+            </a:prstGeom>
+            <a:ln>
+              <a:solidFill>
+                <a:schemeClr val="tx1"/>
+              </a:solidFill>
+            </a:ln>
+          </p:spPr>
+          <p:style>
+            <a:lnRef idx="2">
+              <a:schemeClr val="accent3">
+                <a:shade val="50000"/>
+              </a:schemeClr>
+            </a:lnRef>
+            <a:fillRef idx="1">
+              <a:schemeClr val="accent3"/>
+            </a:fillRef>
+            <a:effectRef idx="0">
+              <a:schemeClr val="accent3"/>
+            </a:effectRef>
+            <a:fontRef idx="minor">
+              <a:schemeClr val="lt1"/>
+            </a:fontRef>
+          </p:style>
+          <p:txBody>
+            <a:bodyPr rtlCol="0" anchor="ctr"/>
+            <a:p>
+              <a:pPr algn="ctr"/>
+              <a:endParaRPr lang="en-US" sz="1400"/>
+            </a:p>
+          </p:txBody>
+        </p:sp>
+        <p:sp>
+          <p:nvSpPr>
+            <p:cNvPr id="5" name="Text Box 4"/>
+            <p:cNvSpPr txBox="true"/>
+            <p:nvPr/>
+          </p:nvSpPr>
+          <p:spPr>
+            <a:xfrm>
+              <a:off x="3072" y="2310"/>
+              <a:ext cx="428" cy="483"/>
+            </a:xfrm>
+            <a:prstGeom prst="rect">
+              <a:avLst/>
+            </a:prstGeom>
+            <a:noFill/>
+          </p:spPr>
+          <p:txBody>
+            <a:bodyPr wrap="none" rtlCol="0">
+              <a:spAutoFit/>
+            </a:bodyPr>
+            <a:p>
+              <a:r>
+                <a:rPr lang="en-US" sz="1400"/>
+                <a:t>u</a:t>
+              </a:r>
+              <a:endParaRPr lang="en-US" sz="1400"/>
+            </a:p>
+          </p:txBody>
+        </p:sp>
+      </p:grpSp>
+      <p:grpSp>
+        <p:nvGrpSpPr>
+          <p:cNvPr id="7" name="Group 6"/>
+          <p:cNvGrpSpPr/>
+          <p:nvPr/>
+        </p:nvGrpSpPr>
+        <p:grpSpPr>
+          <a:xfrm>
+            <a:off x="5521325" y="1812925"/>
+            <a:ext cx="1558290" cy="309880"/>
+            <a:chOff x="2930" y="2890"/>
+            <a:chExt cx="2454" cy="488"/>
+          </a:xfrm>
+        </p:grpSpPr>
+        <p:sp>
+          <p:nvSpPr>
+            <p:cNvPr id="3" name="Rectangle 2"/>
+            <p:cNvSpPr/>
+            <p:nvPr/>
+          </p:nvSpPr>
+          <p:spPr>
+            <a:xfrm>
+              <a:off x="2930" y="2890"/>
+              <a:ext cx="753" cy="488"/>
+            </a:xfrm>
+            <a:prstGeom prst="rect">
+              <a:avLst/>
+            </a:prstGeom>
+          </p:spPr>
+          <p:style>
+            <a:lnRef idx="2">
+              <a:schemeClr val="accent4">
+                <a:shade val="50000"/>
+              </a:schemeClr>
+            </a:lnRef>
+            <a:fillRef idx="1">
+              <a:schemeClr val="accent4"/>
+            </a:fillRef>
+            <a:effectRef idx="0">
+              <a:schemeClr val="accent4"/>
+            </a:effectRef>
+            <a:fontRef idx="minor">
+              <a:schemeClr val="lt1"/>
+            </a:fontRef>
+          </p:style>
+          <p:txBody>
+            <a:bodyPr rtlCol="0" anchor="ctr"/>
+            <a:p>
+              <a:pPr algn="ctr"/>
+              <a:r>
+                <a:rPr lang="en-US" sz="1400" b="1">
+                  <a:solidFill>
+                    <a:schemeClr val="tx1"/>
+                  </a:solidFill>
+                </a:rPr>
+                <a:t>p</a:t>
+              </a:r>
+              <a:endParaRPr lang="en-US" sz="1400" b="1">
+                <a:solidFill>
+                  <a:schemeClr val="tx1"/>
+                </a:solidFill>
+              </a:endParaRPr>
+            </a:p>
+          </p:txBody>
+        </p:sp>
+        <p:sp>
+          <p:nvSpPr>
+            <p:cNvPr id="4" name="Rectangle 3"/>
+            <p:cNvSpPr/>
+            <p:nvPr/>
+          </p:nvSpPr>
+          <p:spPr>
+            <a:xfrm>
+              <a:off x="4632" y="2890"/>
+              <a:ext cx="753" cy="488"/>
+            </a:xfrm>
+            <a:prstGeom prst="rect">
+              <a:avLst/>
+            </a:prstGeom>
+            <a:ln>
+              <a:noFill/>
+            </a:ln>
+          </p:spPr>
+          <p:style>
+            <a:lnRef idx="2">
+              <a:schemeClr val="accent4">
+                <a:shade val="50000"/>
+              </a:schemeClr>
+            </a:lnRef>
+            <a:fillRef idx="1">
+              <a:schemeClr val="accent4"/>
+            </a:fillRef>
+            <a:effectRef idx="0">
+              <a:schemeClr val="accent4"/>
+            </a:effectRef>
+            <a:fontRef idx="minor">
+              <a:schemeClr val="lt1"/>
+            </a:fontRef>
+          </p:style>
+          <p:txBody>
+            <a:bodyPr rtlCol="0" anchor="ctr"/>
+            <a:p>
+              <a:pPr algn="ctr"/>
+              <a:r>
+                <a:rPr lang="en-US" sz="1400">
+                  <a:solidFill>
+                    <a:schemeClr val="tx1"/>
+                  </a:solidFill>
+                </a:rPr>
+                <a:t>obj</a:t>
+              </a:r>
+              <a:endParaRPr lang="en-US" sz="1400">
+                <a:solidFill>
+                  <a:schemeClr val="tx1"/>
+                </a:solidFill>
+              </a:endParaRPr>
+            </a:p>
+          </p:txBody>
+        </p:sp>
+        <p:cxnSp>
+          <p:nvCxnSpPr>
+            <p:cNvPr id="6" name="Straight Arrow Connector 5"/>
+            <p:cNvCxnSpPr>
+              <a:stCxn id="3" idx="3"/>
+              <a:endCxn id="4" idx="1"/>
+            </p:cNvCxnSpPr>
+            <p:nvPr/>
+          </p:nvCxnSpPr>
+          <p:spPr>
+            <a:xfrm>
+              <a:off x="3683" y="3134"/>
+              <a:ext cx="949" cy="0"/>
+            </a:xfrm>
+            <a:prstGeom prst="straightConnector1">
+              <a:avLst/>
+            </a:prstGeom>
+            <a:ln>
+              <a:tailEnd type="arrow" w="med" len="med"/>
+            </a:ln>
+          </p:spPr>
+          <p:style>
+            <a:lnRef idx="1">
+              <a:schemeClr val="dk1"/>
+            </a:lnRef>
+            <a:fillRef idx="0">
+              <a:schemeClr val="dk1"/>
+            </a:fillRef>
+            <a:effectRef idx="0">
+              <a:schemeClr val="dk1"/>
+            </a:effectRef>
+            <a:fontRef idx="minor">
+              <a:schemeClr val="tx1"/>
+            </a:fontRef>
+          </p:style>
+        </p:cxnSp>
+      </p:grpSp>
+      <p:grpSp>
+        <p:nvGrpSpPr>
+          <p:cNvPr id="9" name="Group 8"/>
+          <p:cNvGrpSpPr/>
+          <p:nvPr/>
+        </p:nvGrpSpPr>
+        <p:grpSpPr>
+          <a:xfrm>
+            <a:off x="8136255" y="956310"/>
+            <a:ext cx="1000760" cy="1011555"/>
+            <a:chOff x="2519" y="2152"/>
+            <a:chExt cx="1576" cy="1593"/>
+          </a:xfrm>
+        </p:grpSpPr>
+        <p:sp>
+          <p:nvSpPr>
+            <p:cNvPr id="10" name="Oval 9"/>
+            <p:cNvSpPr/>
+            <p:nvPr/>
+          </p:nvSpPr>
+          <p:spPr>
+            <a:xfrm>
+              <a:off x="2519" y="2152"/>
+              <a:ext cx="1576" cy="1593"/>
+            </a:xfrm>
+            <a:prstGeom prst="ellipse">
+              <a:avLst/>
+            </a:prstGeom>
+            <a:ln>
+              <a:solidFill>
+                <a:schemeClr val="tx1"/>
+              </a:solidFill>
+            </a:ln>
+          </p:spPr>
+          <p:style>
+            <a:lnRef idx="2">
+              <a:schemeClr val="accent3">
+                <a:shade val="50000"/>
+              </a:schemeClr>
+            </a:lnRef>
+            <a:fillRef idx="1">
+              <a:schemeClr val="accent3"/>
+            </a:fillRef>
+            <a:effectRef idx="0">
+              <a:schemeClr val="accent3"/>
+            </a:effectRef>
+            <a:fontRef idx="minor">
+              <a:schemeClr val="lt1"/>
+            </a:fontRef>
+          </p:style>
+          <p:txBody>
+            <a:bodyPr rtlCol="0" anchor="ctr"/>
+            <a:p>
+              <a:pPr algn="ctr"/>
+              <a:endParaRPr lang="en-US" sz="1400"/>
+            </a:p>
+          </p:txBody>
+        </p:sp>
+        <p:sp>
+          <p:nvSpPr>
+            <p:cNvPr id="11" name="Text Box 10"/>
+            <p:cNvSpPr txBox="true"/>
+            <p:nvPr/>
+          </p:nvSpPr>
+          <p:spPr>
+            <a:xfrm>
+              <a:off x="3072" y="2310"/>
+              <a:ext cx="428" cy="483"/>
+            </a:xfrm>
+            <a:prstGeom prst="rect">
+              <a:avLst/>
+            </a:prstGeom>
+            <a:noFill/>
+          </p:spPr>
+          <p:txBody>
+            <a:bodyPr wrap="none" rtlCol="0">
+              <a:spAutoFit/>
+            </a:bodyPr>
+            <a:p>
+              <a:r>
+                <a:rPr lang="en-US" sz="1400"/>
+                <a:t>u</a:t>
+              </a:r>
+              <a:endParaRPr lang="en-US" sz="1400"/>
+            </a:p>
+          </p:txBody>
+        </p:sp>
+      </p:grpSp>
+      <p:grpSp>
+        <p:nvGrpSpPr>
+          <p:cNvPr id="12" name="Group 11"/>
+          <p:cNvGrpSpPr/>
+          <p:nvPr/>
+        </p:nvGrpSpPr>
+        <p:grpSpPr>
+          <a:xfrm>
+            <a:off x="8396605" y="2136140"/>
+            <a:ext cx="1558290" cy="309880"/>
+            <a:chOff x="2930" y="2890"/>
+            <a:chExt cx="2454" cy="488"/>
+          </a:xfrm>
+        </p:grpSpPr>
+        <p:sp>
+          <p:nvSpPr>
+            <p:cNvPr id="13" name="Rectangle 12"/>
+            <p:cNvSpPr/>
+            <p:nvPr/>
+          </p:nvSpPr>
+          <p:spPr>
+            <a:xfrm>
+              <a:off x="2930" y="2890"/>
+              <a:ext cx="753" cy="488"/>
+            </a:xfrm>
+            <a:prstGeom prst="rect">
+              <a:avLst/>
+            </a:prstGeom>
+          </p:spPr>
+          <p:style>
+            <a:lnRef idx="2">
+              <a:schemeClr val="accent4">
+                <a:shade val="50000"/>
+              </a:schemeClr>
+            </a:lnRef>
+            <a:fillRef idx="1">
+              <a:schemeClr val="accent4"/>
+            </a:fillRef>
+            <a:effectRef idx="0">
+              <a:schemeClr val="accent4"/>
+            </a:effectRef>
+            <a:fontRef idx="minor">
+              <a:schemeClr val="lt1"/>
+            </a:fontRef>
+          </p:style>
+          <p:txBody>
+            <a:bodyPr rtlCol="0" anchor="ctr"/>
+            <a:p>
+              <a:pPr algn="ctr"/>
+              <a:r>
+                <a:rPr lang="en-US" sz="1400" b="1">
+                  <a:solidFill>
+                    <a:schemeClr val="tx1"/>
+                  </a:solidFill>
+                </a:rPr>
+                <a:t>p</a:t>
+              </a:r>
+              <a:endParaRPr lang="en-US" sz="1400" b="1">
+                <a:solidFill>
+                  <a:schemeClr val="tx1"/>
+                </a:solidFill>
+              </a:endParaRPr>
+            </a:p>
+          </p:txBody>
+        </p:sp>
+        <p:sp>
+          <p:nvSpPr>
+            <p:cNvPr id="14" name="Rectangle 13"/>
+            <p:cNvSpPr/>
+            <p:nvPr/>
+          </p:nvSpPr>
+          <p:spPr>
+            <a:xfrm>
+              <a:off x="4632" y="2890"/>
+              <a:ext cx="753" cy="488"/>
+            </a:xfrm>
+            <a:prstGeom prst="rect">
+              <a:avLst/>
+            </a:prstGeom>
+            <a:ln>
+              <a:noFill/>
+            </a:ln>
+          </p:spPr>
+          <p:style>
+            <a:lnRef idx="2">
+              <a:schemeClr val="accent4">
+                <a:shade val="50000"/>
+              </a:schemeClr>
+            </a:lnRef>
+            <a:fillRef idx="1">
+              <a:schemeClr val="accent4"/>
+            </a:fillRef>
+            <a:effectRef idx="0">
+              <a:schemeClr val="accent4"/>
+            </a:effectRef>
+            <a:fontRef idx="minor">
+              <a:schemeClr val="lt1"/>
+            </a:fontRef>
+          </p:style>
+          <p:txBody>
+            <a:bodyPr rtlCol="0" anchor="ctr"/>
+            <a:p>
+              <a:pPr algn="ctr"/>
+              <a:r>
+                <a:rPr lang="en-US" sz="1400">
+                  <a:solidFill>
+                    <a:schemeClr val="tx1"/>
+                  </a:solidFill>
+                </a:rPr>
+                <a:t>obj</a:t>
+              </a:r>
+              <a:endParaRPr lang="en-US" sz="1400">
+                <a:solidFill>
+                  <a:schemeClr val="tx1"/>
+                </a:solidFill>
+              </a:endParaRPr>
+            </a:p>
+          </p:txBody>
+        </p:sp>
+        <p:cxnSp>
+          <p:nvCxnSpPr>
+            <p:cNvPr id="15" name="Straight Arrow Connector 14"/>
+            <p:cNvCxnSpPr>
+              <a:stCxn id="13" idx="3"/>
+              <a:endCxn id="14" idx="1"/>
+            </p:cNvCxnSpPr>
+            <p:nvPr/>
+          </p:nvCxnSpPr>
+          <p:spPr>
+            <a:xfrm>
+              <a:off x="3683" y="3134"/>
+              <a:ext cx="949" cy="0"/>
+            </a:xfrm>
+            <a:prstGeom prst="straightConnector1">
+              <a:avLst/>
+            </a:prstGeom>
+            <a:ln>
+              <a:tailEnd type="arrow" w="med" len="med"/>
+            </a:ln>
+          </p:spPr>
+          <p:style>
+            <a:lnRef idx="1">
+              <a:schemeClr val="dk1"/>
+            </a:lnRef>
+            <a:fillRef idx="0">
+              <a:schemeClr val="dk1"/>
+            </a:fillRef>
+            <a:effectRef idx="0">
+              <a:schemeClr val="dk1"/>
+            </a:effectRef>
+            <a:fontRef idx="minor">
+              <a:schemeClr val="tx1"/>
+            </a:fontRef>
+          </p:style>
+        </p:cxnSp>
+      </p:grpSp>
+      <p:sp>
+        <p:nvSpPr>
+          <p:cNvPr id="16" name="Rectangle 15"/>
+          <p:cNvSpPr/>
+          <p:nvPr/>
+        </p:nvSpPr>
+        <p:spPr>
+          <a:xfrm>
+            <a:off x="8352790" y="1457960"/>
+            <a:ext cx="566420" cy="309880"/>
+          </a:xfrm>
+          <a:prstGeom prst="rect">
+            <a:avLst/>
+          </a:prstGeom>
+        </p:spPr>
+        <p:style>
+          <a:lnRef idx="2">
+            <a:schemeClr val="accent4">
+              <a:shade val="50000"/>
+            </a:schemeClr>
+          </a:lnRef>
+          <a:fillRef idx="1">
+            <a:schemeClr val="accent4"/>
+          </a:fillRef>
+          <a:effectRef idx="0">
+            <a:schemeClr val="accent4"/>
+          </a:effectRef>
+          <a:fontRef idx="minor">
+            <a:schemeClr val="lt1"/>
+          </a:fontRef>
+        </p:style>
+        <p:txBody>
+          <a:bodyPr rtlCol="0" anchor="ctr"/>
+          <a:p>
+            <a:pPr algn="ctr"/>
+            <a:r>
+              <a:rPr lang="en-US" sz="1400" b="1">
+                <a:solidFill>
+                  <a:schemeClr val="tx1"/>
+                </a:solidFill>
+              </a:rPr>
+              <a:t>null</a:t>
+            </a:r>
+            <a:endParaRPr lang="en-US" sz="1400" b="1">
+              <a:solidFill>
+                <a:schemeClr val="tx1"/>
+              </a:solidFill>
+            </a:endParaRPr>
+          </a:p>
+        </p:txBody>
+      </p:sp>
+      <p:grpSp>
+        <p:nvGrpSpPr>
+          <p:cNvPr id="24" name="Group 23"/>
+          <p:cNvGrpSpPr/>
+          <p:nvPr/>
+        </p:nvGrpSpPr>
+        <p:grpSpPr>
+          <a:xfrm>
+            <a:off x="3086100" y="1344295"/>
+            <a:ext cx="1000760" cy="1011555"/>
+            <a:chOff x="2519" y="2152"/>
+            <a:chExt cx="1576" cy="1593"/>
+          </a:xfrm>
+        </p:grpSpPr>
+        <p:sp>
+          <p:nvSpPr>
+            <p:cNvPr id="25" name="Oval 24"/>
+            <p:cNvSpPr/>
+            <p:nvPr/>
+          </p:nvSpPr>
+          <p:spPr>
+            <a:xfrm>
+              <a:off x="2519" y="2152"/>
+              <a:ext cx="1576" cy="1593"/>
+            </a:xfrm>
+            <a:prstGeom prst="ellipse">
+              <a:avLst/>
+            </a:prstGeom>
+            <a:ln>
+              <a:solidFill>
+                <a:schemeClr val="tx1"/>
+              </a:solidFill>
+            </a:ln>
+          </p:spPr>
+          <p:style>
+            <a:lnRef idx="2">
+              <a:schemeClr val="accent3">
+                <a:shade val="50000"/>
+              </a:schemeClr>
+            </a:lnRef>
+            <a:fillRef idx="1">
+              <a:schemeClr val="accent3"/>
+            </a:fillRef>
+            <a:effectRef idx="0">
+              <a:schemeClr val="accent3"/>
+            </a:effectRef>
+            <a:fontRef idx="minor">
+              <a:schemeClr val="lt1"/>
+            </a:fontRef>
+          </p:style>
+          <p:txBody>
+            <a:bodyPr rtlCol="0" anchor="ctr"/>
+            <a:p>
+              <a:pPr algn="ctr"/>
+              <a:endParaRPr lang="en-US" sz="1400"/>
+            </a:p>
+          </p:txBody>
+        </p:sp>
+        <p:sp>
+          <p:nvSpPr>
+            <p:cNvPr id="26" name="Text Box 25"/>
+            <p:cNvSpPr txBox="true"/>
+            <p:nvPr/>
+          </p:nvSpPr>
+          <p:spPr>
+            <a:xfrm>
+              <a:off x="3072" y="2310"/>
+              <a:ext cx="428" cy="483"/>
+            </a:xfrm>
+            <a:prstGeom prst="rect">
+              <a:avLst/>
+            </a:prstGeom>
+            <a:noFill/>
+          </p:spPr>
+          <p:txBody>
+            <a:bodyPr wrap="none" rtlCol="0">
+              <a:spAutoFit/>
+            </a:bodyPr>
+            <a:p>
+              <a:r>
+                <a:rPr lang="en-US" sz="1400"/>
+                <a:t>u</a:t>
+              </a:r>
+              <a:endParaRPr lang="en-US" sz="1400"/>
+            </a:p>
+          </p:txBody>
+        </p:sp>
+      </p:grpSp>
+      <p:sp>
+        <p:nvSpPr>
+          <p:cNvPr id="27" name="Rectangle 26"/>
+          <p:cNvSpPr/>
+          <p:nvPr/>
+        </p:nvSpPr>
+        <p:spPr>
+          <a:xfrm>
+            <a:off x="3302635" y="1845945"/>
+            <a:ext cx="566420" cy="309880"/>
+          </a:xfrm>
+          <a:prstGeom prst="rect">
+            <a:avLst/>
+          </a:prstGeom>
+        </p:spPr>
+        <p:style>
+          <a:lnRef idx="2">
+            <a:schemeClr val="accent4">
+              <a:shade val="50000"/>
+            </a:schemeClr>
+          </a:lnRef>
+          <a:fillRef idx="1">
+            <a:schemeClr val="accent4"/>
+          </a:fillRef>
+          <a:effectRef idx="0">
+            <a:schemeClr val="accent4"/>
+          </a:effectRef>
+          <a:fontRef idx="minor">
+            <a:schemeClr val="lt1"/>
+          </a:fontRef>
+        </p:style>
+        <p:txBody>
+          <a:bodyPr rtlCol="0" anchor="ctr"/>
+          <a:p>
+            <a:pPr algn="ctr"/>
+            <a:r>
+              <a:rPr lang="en-US" sz="1400" b="1">
+                <a:solidFill>
+                  <a:schemeClr val="tx1"/>
+                </a:solidFill>
+              </a:rPr>
+              <a:t>null</a:t>
+            </a:r>
+            <a:endParaRPr lang="en-US" sz="1400" b="1">
+              <a:solidFill>
+                <a:schemeClr val="tx1"/>
+              </a:solidFill>
+            </a:endParaRPr>
+          </a:p>
+        </p:txBody>
+      </p:sp>
+      <p:sp>
+        <p:nvSpPr>
+          <p:cNvPr id="28" name="Left Arrow 27"/>
+          <p:cNvSpPr/>
+          <p:nvPr/>
+        </p:nvSpPr>
+        <p:spPr>
+          <a:xfrm>
+            <a:off x="4256405" y="1751330"/>
+            <a:ext cx="833755" cy="278130"/>
+          </a:xfrm>
+          <a:prstGeom prst="leftArrow">
+            <a:avLst/>
+          </a:prstGeom>
+        </p:spPr>
+        <p:style>
+          <a:lnRef idx="2">
+            <a:schemeClr val="accent1">
+              <a:shade val="50000"/>
+            </a:schemeClr>
+          </a:lnRef>
+          <a:fillRef idx="1">
+            <a:schemeClr val="accent1"/>
+          </a:fillRef>
+          <a:effectRef idx="0">
+            <a:schemeClr val="accent1"/>
+          </a:effectRef>
+          <a:fontRef idx="minor">
+            <a:schemeClr val="lt1"/>
+          </a:fontRef>
+        </p:style>
+        <p:txBody>
+          <a:bodyPr rtlCol="0" anchor="ctr"/>
+          <a:p>
+            <a:pPr algn="ctr"/>
+            <a:endParaRPr lang="en-US"/>
+          </a:p>
+        </p:txBody>
+      </p:sp>
+      <p:sp>
+        <p:nvSpPr>
+          <p:cNvPr id="29" name="Left Arrow 28"/>
+          <p:cNvSpPr/>
+          <p:nvPr/>
+        </p:nvSpPr>
+        <p:spPr>
+          <a:xfrm rot="10800000">
+            <a:off x="7183755" y="1812925"/>
+            <a:ext cx="833755" cy="278130"/>
+          </a:xfrm>
+          <a:prstGeom prst="leftArrow">
+            <a:avLst/>
+          </a:prstGeom>
+        </p:spPr>
+        <p:style>
+          <a:lnRef idx="2">
+            <a:schemeClr val="accent1">
+              <a:shade val="50000"/>
+            </a:schemeClr>
+          </a:lnRef>
+          <a:fillRef idx="1">
+            <a:schemeClr val="accent1"/>
+          </a:fillRef>
+          <a:effectRef idx="0">
+            <a:schemeClr val="accent1"/>
+          </a:effectRef>
+          <a:fontRef idx="minor">
+            <a:schemeClr val="lt1"/>
+          </a:fontRef>
+        </p:style>
+        <p:txBody>
+          <a:bodyPr rtlCol="0" anchor="ctr"/>
+          <a:p>
+            <a:pPr algn="ctr"/>
+            <a:endParaRPr lang="en-US"/>
+          </a:p>
+        </p:txBody>
+      </p:sp>
+      <p:sp>
+        <p:nvSpPr>
+          <p:cNvPr id="30" name="Text Box 29"/>
+          <p:cNvSpPr txBox="true"/>
+          <p:nvPr/>
+        </p:nvSpPr>
+        <p:spPr>
+          <a:xfrm>
+            <a:off x="4288790" y="1363345"/>
+            <a:ext cx="769620" cy="306705"/>
+          </a:xfrm>
+          <a:prstGeom prst="rect">
+            <a:avLst/>
+          </a:prstGeom>
+          <a:noFill/>
+        </p:spPr>
+        <p:txBody>
+          <a:bodyPr wrap="none" rtlCol="0">
+            <a:spAutoFit/>
+          </a:bodyPr>
+          <a:p>
+            <a:r>
+              <a:rPr lang="en-US" sz="1400"/>
+              <a:t>u.reset()</a:t>
+            </a:r>
+            <a:endParaRPr lang="en-US" sz="1400"/>
+          </a:p>
+        </p:txBody>
+      </p:sp>
+      <p:sp>
+        <p:nvSpPr>
+          <p:cNvPr id="31" name="Text Box 30"/>
+          <p:cNvSpPr txBox="true"/>
+          <p:nvPr/>
+        </p:nvSpPr>
+        <p:spPr>
+          <a:xfrm>
+            <a:off x="7080250" y="1444625"/>
+            <a:ext cx="927100" cy="306705"/>
+          </a:xfrm>
+          <a:prstGeom prst="rect">
+            <a:avLst/>
+          </a:prstGeom>
+          <a:noFill/>
+        </p:spPr>
+        <p:txBody>
+          <a:bodyPr wrap="none" rtlCol="0">
+            <a:spAutoFit/>
+          </a:bodyPr>
+          <a:p>
+            <a:r>
+              <a:rPr lang="en-US" sz="1400"/>
+              <a:t>u.release()</a:t>
+            </a:r>
+            <a:endParaRPr lang="en-US" sz="1400"/>
+          </a:p>
+        </p:txBody>
+      </p:sp>
     </p:spTree>
   </p:cSld>
   <p:clrMapOvr>

</xml_diff>

<commit_message>
Site updated: 2022-01-12 11:58:07
</commit_message>
<xml_diff>
--- a/img/blog.pptx
+++ b/img/blog.pptx
@@ -18311,6 +18311,1113 @@
         <p:nvPr/>
       </p:nvGrpSpPr>
       <p:grpSpPr/>
+      <p:graphicFrame>
+        <p:nvGraphicFramePr>
+          <p:cNvPr id="2" name="Table 1"/>
+          <p:cNvGraphicFramePr/>
+          <p:nvPr/>
+        </p:nvGraphicFramePr>
+        <p:xfrm>
+          <a:off x="1824355" y="2286000"/>
+          <a:ext cx="8534400" cy="2194560"/>
+        </p:xfrm>
+        <a:graphic>
+          <a:graphicData uri="http://schemas.openxmlformats.org/drawingml/2006/table">
+            <a:tbl>
+              <a:tblPr firstRow="true" bandRow="true">
+                <a:tableStyleId>{5C22544A-7EE6-4342-B048-85BDC9FD1C3A}</a:tableStyleId>
+              </a:tblPr>
+              <a:tblGrid>
+                <a:gridCol w="560070"/>
+                <a:gridCol w="595630"/>
+                <a:gridCol w="616585"/>
+                <a:gridCol w="1438275"/>
+                <a:gridCol w="875665"/>
+                <a:gridCol w="1200785"/>
+                <a:gridCol w="3247390"/>
+              </a:tblGrid>
+              <a:tr h="365760">
+                <a:tc>
+                  <a:txBody>
+                    <a:bodyPr/>
+                    <a:p>
+                      <a:pPr algn="ctr">
+                        <a:buNone/>
+                      </a:pPr>
+                      <a:endParaRPr lang="en-US"/>
+                    </a:p>
+                  </a:txBody>
+                  <a:tcPr/>
+                </a:tc>
+                <a:tc>
+                  <a:txBody>
+                    <a:bodyPr/>
+                    <a:p>
+                      <a:pPr algn="ctr">
+                        <a:buNone/>
+                      </a:pPr>
+                      <a:endParaRPr lang="en-US"/>
+                    </a:p>
+                  </a:txBody>
+                  <a:tcPr/>
+                </a:tc>
+                <a:tc>
+                  <a:txBody>
+                    <a:bodyPr/>
+                    <a:p>
+                      <a:pPr algn="ctr">
+                        <a:buNone/>
+                      </a:pPr>
+                      <a:endParaRPr lang="en-US"/>
+                    </a:p>
+                  </a:txBody>
+                  <a:tcPr/>
+                </a:tc>
+                <a:tc>
+                  <a:txBody>
+                    <a:bodyPr/>
+                    <a:p>
+                      <a:pPr algn="ctr">
+                        <a:buNone/>
+                      </a:pPr>
+                      <a:endParaRPr lang="en-US"/>
+                    </a:p>
+                  </a:txBody>
+                  <a:tcPr/>
+                </a:tc>
+                <a:tc>
+                  <a:txBody>
+                    <a:bodyPr/>
+                    <a:p>
+                      <a:pPr algn="ctr">
+                        <a:buNone/>
+                      </a:pPr>
+                      <a:r>
+                        <a:rPr lang="en-US" altLang="zh-CN"/>
+                        <a:t>CIA</a:t>
+                      </a:r>
+                      <a:endParaRPr lang="en-US" altLang="zh-CN"/>
+                    </a:p>
+                  </a:txBody>
+                  <a:tcPr/>
+                </a:tc>
+                <a:tc>
+                  <a:txBody>
+                    <a:bodyPr/>
+                    <a:p>
+                      <a:pPr algn="ctr">
+                        <a:buNone/>
+                      </a:pPr>
+                      <a:r>
+                        <a:rPr lang="en-US"/>
+                        <a:t>FBI</a:t>
+                      </a:r>
+                      <a:endParaRPr lang="en-US"/>
+                    </a:p>
+                  </a:txBody>
+                  <a:tcPr/>
+                </a:tc>
+                <a:tc>
+                  <a:txBody>
+                    <a:bodyPr/>
+                    <a:p>
+                      <a:pPr algn="ctr">
+                        <a:buNone/>
+                      </a:pPr>
+                      <a:r>
+                        <a:rPr lang="en-US"/>
+                        <a:t>DS</a:t>
+                      </a:r>
+                      <a:r>
+                        <a:rPr lang="zh-CN" altLang="en-US"/>
+                        <a:t>合成结果</a:t>
+                      </a:r>
+                      <a:endParaRPr lang="zh-CN" altLang="en-US"/>
+                    </a:p>
+                  </a:txBody>
+                  <a:tcPr/>
+                </a:tc>
+              </a:tr>
+              <a:tr h="365760">
+                <a:tc>
+                  <a:txBody>
+                    <a:bodyPr/>
+                    <a:p>
+                      <a:pPr algn="ctr">
+                        <a:buNone/>
+                      </a:pPr>
+                      <a:endParaRPr lang="zh-CN" altLang="en-US"/>
+                    </a:p>
+                  </a:txBody>
+                  <a:tcPr/>
+                </a:tc>
+                <a:tc>
+                  <a:txBody>
+                    <a:bodyPr/>
+                    <a:p>
+                      <a:pPr algn="ctr">
+                        <a:buNone/>
+                      </a:pPr>
+                      <a:r>
+                        <a:rPr lang="en-US" altLang="zh-CN"/>
+                        <a:t>A’</a:t>
+                      </a:r>
+                      <a:endParaRPr lang="en-US" altLang="zh-CN"/>
+                    </a:p>
+                  </a:txBody>
+                  <a:tcPr/>
+                </a:tc>
+                <a:tc>
+                  <a:txBody>
+                    <a:bodyPr/>
+                    <a:p>
+                      <a:pPr algn="ctr">
+                        <a:buNone/>
+                      </a:pPr>
+                      <a:r>
+                        <a:rPr lang="en-US" altLang="zh-CN"/>
+                        <a:t>A*</a:t>
+                      </a:r>
+                      <a:endParaRPr lang="en-US" altLang="zh-CN"/>
+                    </a:p>
+                  </a:txBody>
+                  <a:tcPr/>
+                </a:tc>
+                <a:tc>
+                  <a:txBody>
+                    <a:bodyPr/>
+                    <a:p>
+                      <a:pPr algn="ctr">
+                        <a:buNone/>
+                      </a:pPr>
+                      <a:r>
+                        <a:rPr lang="zh-CN" altLang="en-US"/>
+                        <a:t>本</a:t>
+                      </a:r>
+                      <a:endParaRPr lang="zh-CN" altLang="en-US"/>
+                    </a:p>
+                  </a:txBody>
+                  <a:tcPr/>
+                </a:tc>
+                <a:tc>
+                  <a:txBody>
+                    <a:bodyPr/>
+                    <a:p>
+                      <a:pPr algn="ctr">
+                        <a:buNone/>
+                      </a:pPr>
+                      <a:r>
+                        <a:rPr lang="en-US"/>
+                        <a:t>0.4</a:t>
+                      </a:r>
+                      <a:endParaRPr lang="en-US"/>
+                    </a:p>
+                  </a:txBody>
+                  <a:tcPr/>
+                </a:tc>
+                <a:tc>
+                  <a:txBody>
+                    <a:bodyPr/>
+                    <a:p>
+                      <a:pPr algn="ctr">
+                        <a:buNone/>
+                      </a:pPr>
+                      <a:r>
+                        <a:rPr lang="en-US"/>
+                        <a:t>0.2</a:t>
+                      </a:r>
+                      <a:endParaRPr lang="en-US"/>
+                    </a:p>
+                  </a:txBody>
+                  <a:tcPr/>
+                </a:tc>
+                <a:tc>
+                  <a:txBody>
+                    <a:bodyPr/>
+                    <a:p>
+                      <a:pPr algn="ctr">
+                        <a:buNone/>
+                      </a:pPr>
+                      <a:r>
+                        <a:rPr lang="en-US"/>
+                        <a:t>-</a:t>
+                      </a:r>
+                      <a:endParaRPr lang="en-US"/>
+                    </a:p>
+                  </a:txBody>
+                  <a:tcPr/>
+                </a:tc>
+              </a:tr>
+              <a:tr h="365760">
+                <a:tc>
+                  <a:txBody>
+                    <a:bodyPr/>
+                    <a:p>
+                      <a:pPr algn="ctr">
+                        <a:buNone/>
+                      </a:pPr>
+                      <a:endParaRPr lang="zh-CN" altLang="en-US"/>
+                    </a:p>
+                  </a:txBody>
+                  <a:tcPr/>
+                </a:tc>
+                <a:tc>
+                  <a:txBody>
+                    <a:bodyPr/>
+                    <a:p>
+                      <a:pPr algn="ctr">
+                        <a:buNone/>
+                      </a:pPr>
+                      <a:r>
+                        <a:rPr lang="en-US" altLang="zh-CN"/>
+                        <a:t>A’</a:t>
+                      </a:r>
+                      <a:endParaRPr lang="en-US" altLang="zh-CN"/>
+                    </a:p>
+                  </a:txBody>
+                  <a:tcPr/>
+                </a:tc>
+                <a:tc>
+                  <a:txBody>
+                    <a:bodyPr/>
+                    <a:p>
+                      <a:pPr algn="ctr">
+                        <a:buNone/>
+                      </a:pPr>
+                      <a:r>
+                        <a:rPr lang="en-US" altLang="zh-CN"/>
+                        <a:t>A*</a:t>
+                      </a:r>
+                      <a:endParaRPr lang="en-US" altLang="zh-CN"/>
+                    </a:p>
+                  </a:txBody>
+                  <a:tcPr/>
+                </a:tc>
+                <a:tc>
+                  <a:txBody>
+                    <a:bodyPr/>
+                    <a:p>
+                      <a:pPr algn="ctr">
+                        <a:buNone/>
+                      </a:pPr>
+                      <a:r>
+                        <a:rPr lang="zh-CN" altLang="en-US"/>
+                        <a:t>萨</a:t>
+                      </a:r>
+                      <a:endParaRPr lang="zh-CN" altLang="en-US"/>
+                    </a:p>
+                  </a:txBody>
+                  <a:tcPr/>
+                </a:tc>
+                <a:tc>
+                  <a:txBody>
+                    <a:bodyPr/>
+                    <a:p>
+                      <a:pPr algn="ctr">
+                        <a:buNone/>
+                      </a:pPr>
+                      <a:r>
+                        <a:rPr lang="en-US"/>
+                        <a:t>0.3</a:t>
+                      </a:r>
+                      <a:endParaRPr lang="en-US"/>
+                    </a:p>
+                  </a:txBody>
+                  <a:tcPr/>
+                </a:tc>
+                <a:tc>
+                  <a:txBody>
+                    <a:bodyPr/>
+                    <a:p>
+                      <a:pPr algn="ctr">
+                        <a:buNone/>
+                      </a:pPr>
+                      <a:r>
+                        <a:rPr lang="en-US"/>
+                        <a:t>0.2</a:t>
+                      </a:r>
+                      <a:endParaRPr lang="en-US"/>
+                    </a:p>
+                  </a:txBody>
+                  <a:tcPr/>
+                </a:tc>
+                <a:tc>
+                  <a:txBody>
+                    <a:bodyPr/>
+                    <a:p>
+                      <a:pPr algn="ctr">
+                        <a:buNone/>
+                      </a:pPr>
+                      <a:r>
+                        <a:rPr lang="en-US"/>
+                        <a:t>-</a:t>
+                      </a:r>
+                      <a:endParaRPr lang="en-US"/>
+                    </a:p>
+                  </a:txBody>
+                  <a:tcPr/>
+                </a:tc>
+              </a:tr>
+              <a:tr h="365760">
+                <a:tc>
+                  <a:txBody>
+                    <a:bodyPr/>
+                    <a:p>
+                      <a:pPr algn="ctr">
+                        <a:buNone/>
+                      </a:pPr>
+                      <a:endParaRPr lang="zh-CN" altLang="en-US"/>
+                    </a:p>
+                  </a:txBody>
+                  <a:tcPr/>
+                </a:tc>
+                <a:tc>
+                  <a:txBody>
+                    <a:bodyPr/>
+                    <a:p>
+                      <a:pPr algn="ctr">
+                        <a:buNone/>
+                      </a:pPr>
+                      <a:endParaRPr lang="zh-CN" altLang="en-US"/>
+                    </a:p>
+                  </a:txBody>
+                  <a:tcPr/>
+                </a:tc>
+                <a:tc>
+                  <a:txBody>
+                    <a:bodyPr/>
+                    <a:p>
+                      <a:pPr algn="ctr">
+                        <a:buNone/>
+                      </a:pPr>
+                      <a:endParaRPr lang="zh-CN" altLang="en-US"/>
+                    </a:p>
+                  </a:txBody>
+                  <a:tcPr/>
+                </a:tc>
+                <a:tc>
+                  <a:txBody>
+                    <a:bodyPr/>
+                    <a:p>
+                      <a:pPr algn="ctr">
+                        <a:buNone/>
+                      </a:pPr>
+                      <a:r>
+                        <a:rPr lang="zh-CN" altLang="en-US"/>
+                        <a:t>霍</a:t>
+                      </a:r>
+                      <a:endParaRPr lang="zh-CN" altLang="en-US"/>
+                    </a:p>
+                  </a:txBody>
+                  <a:tcPr/>
+                </a:tc>
+                <a:tc>
+                  <a:txBody>
+                    <a:bodyPr/>
+                    <a:p>
+                      <a:pPr algn="ctr">
+                        <a:buNone/>
+                      </a:pPr>
+                      <a:r>
+                        <a:rPr lang="en-US"/>
+                        <a:t>0.1</a:t>
+                      </a:r>
+                      <a:endParaRPr lang="en-US"/>
+                    </a:p>
+                  </a:txBody>
+                  <a:tcPr/>
+                </a:tc>
+                <a:tc>
+                  <a:txBody>
+                    <a:bodyPr/>
+                    <a:p>
+                      <a:pPr algn="ctr">
+                        <a:buNone/>
+                      </a:pPr>
+                      <a:r>
+                        <a:rPr lang="en-US"/>
+                        <a:t>0.05</a:t>
+                      </a:r>
+                      <a:endParaRPr lang="en-US"/>
+                    </a:p>
+                  </a:txBody>
+                  <a:tcPr/>
+                </a:tc>
+                <a:tc>
+                  <a:txBody>
+                    <a:bodyPr/>
+                    <a:p>
+                      <a:pPr algn="ctr">
+                        <a:buNone/>
+                      </a:pPr>
+                      <a:r>
+                        <a:rPr lang="en-US"/>
+                        <a:t>-</a:t>
+                      </a:r>
+                      <a:endParaRPr lang="en-US"/>
+                    </a:p>
+                  </a:txBody>
+                  <a:tcPr/>
+                </a:tc>
+              </a:tr>
+              <a:tr h="365760">
+                <a:tc>
+                  <a:txBody>
+                    <a:bodyPr/>
+                    <a:p>
+                      <a:pPr algn="ctr">
+                        <a:buNone/>
+                      </a:pPr>
+                      <a:r>
+                        <a:rPr lang="en-US" altLang="zh-CN"/>
+                        <a:t>A</a:t>
+                      </a:r>
+                      <a:endParaRPr lang="en-US" altLang="zh-CN"/>
+                    </a:p>
+                  </a:txBody>
+                  <a:tcPr/>
+                </a:tc>
+                <a:tc>
+                  <a:txBody>
+                    <a:bodyPr/>
+                    <a:p>
+                      <a:pPr algn="ctr">
+                        <a:buNone/>
+                      </a:pPr>
+                      <a:r>
+                        <a:rPr lang="en-US" altLang="zh-CN"/>
+                        <a:t>A’</a:t>
+                      </a:r>
+                      <a:endParaRPr lang="en-US" altLang="zh-CN"/>
+                    </a:p>
+                  </a:txBody>
+                  <a:tcPr/>
+                </a:tc>
+                <a:tc>
+                  <a:txBody>
+                    <a:bodyPr/>
+                    <a:p>
+                      <a:pPr algn="ctr">
+                        <a:buNone/>
+                      </a:pPr>
+                      <a:r>
+                        <a:rPr lang="en-US" altLang="zh-CN"/>
+                        <a:t>A*</a:t>
+                      </a:r>
+                      <a:endParaRPr lang="en-US" altLang="zh-CN"/>
+                    </a:p>
+                  </a:txBody>
+                  <a:tcPr/>
+                </a:tc>
+                <a:tc>
+                  <a:txBody>
+                    <a:bodyPr/>
+                    <a:p>
+                      <a:pPr algn="ctr">
+                        <a:buNone/>
+                      </a:pPr>
+                      <a:r>
+                        <a:rPr lang="zh-CN" altLang="en-US"/>
+                        <a:t>本，萨</a:t>
+                      </a:r>
+                      <a:endParaRPr lang="zh-CN" altLang="en-US"/>
+                    </a:p>
+                  </a:txBody>
+                  <a:tcPr/>
+                </a:tc>
+                <a:tc>
+                  <a:txBody>
+                    <a:bodyPr/>
+                    <a:p>
+                      <a:pPr algn="ctr">
+                        <a:buNone/>
+                      </a:pPr>
+                      <a:r>
+                        <a:rPr lang="en-US"/>
+                        <a:t>0.1</a:t>
+                      </a:r>
+                      <a:endParaRPr lang="en-US"/>
+                    </a:p>
+                  </a:txBody>
+                  <a:tcPr/>
+                </a:tc>
+                <a:tc>
+                  <a:txBody>
+                    <a:bodyPr/>
+                    <a:p>
+                      <a:pPr algn="ctr">
+                        <a:buNone/>
+                      </a:pPr>
+                      <a:r>
+                        <a:rPr lang="en-US"/>
+                        <a:t>0.50</a:t>
+                      </a:r>
+                      <a:endParaRPr lang="en-US"/>
+                    </a:p>
+                  </a:txBody>
+                  <a:tcPr/>
+                </a:tc>
+                <a:tc>
+                  <a:txBody>
+                    <a:bodyPr/>
+                    <a:p>
+                      <a:pPr algn="ctr">
+                        <a:buNone/>
+                      </a:pPr>
+                      <a:r>
+                        <a:rPr lang="en-US"/>
+                        <a:t>-</a:t>
+                      </a:r>
+                      <a:endParaRPr lang="en-US"/>
+                    </a:p>
+                  </a:txBody>
+                  <a:tcPr/>
+                </a:tc>
+              </a:tr>
+              <a:tr h="365760">
+                <a:tc>
+                  <a:txBody>
+                    <a:bodyPr/>
+                    <a:p>
+                      <a:pPr algn="ctr">
+                        <a:buNone/>
+                      </a:pPr>
+                      <a:endParaRPr lang="zh-CN" altLang="en-US"/>
+                    </a:p>
+                  </a:txBody>
+                  <a:tcPr/>
+                </a:tc>
+                <a:tc>
+                  <a:txBody>
+                    <a:bodyPr/>
+                    <a:p>
+                      <a:pPr algn="ctr">
+                        <a:buNone/>
+                      </a:pPr>
+                      <a:endParaRPr lang="zh-CN" altLang="en-US"/>
+                    </a:p>
+                  </a:txBody>
+                  <a:tcPr/>
+                </a:tc>
+                <a:tc>
+                  <a:txBody>
+                    <a:bodyPr/>
+                    <a:p>
+                      <a:pPr algn="ctr">
+                        <a:buNone/>
+                      </a:pPr>
+                      <a:r>
+                        <a:rPr lang="en-US" altLang="zh-CN"/>
+                        <a:t>A*</a:t>
+                      </a:r>
+                      <a:endParaRPr lang="en-US" altLang="zh-CN"/>
+                    </a:p>
+                  </a:txBody>
+                  <a:tcPr/>
+                </a:tc>
+                <a:tc>
+                  <a:txBody>
+                    <a:bodyPr/>
+                    <a:p>
+                      <a:pPr algn="ctr">
+                        <a:buNone/>
+                      </a:pPr>
+                      <a:r>
+                        <a:rPr lang="zh-CN" altLang="en-US"/>
+                        <a:t>本，萨，霍</a:t>
+                      </a:r>
+                      <a:endParaRPr lang="zh-CN" altLang="en-US"/>
+                    </a:p>
+                  </a:txBody>
+                  <a:tcPr/>
+                </a:tc>
+                <a:tc>
+                  <a:txBody>
+                    <a:bodyPr/>
+                    <a:p>
+                      <a:pPr algn="ctr">
+                        <a:buNone/>
+                      </a:pPr>
+                      <a:r>
+                        <a:rPr lang="en-US"/>
+                        <a:t>0.1</a:t>
+                      </a:r>
+                      <a:endParaRPr lang="en-US"/>
+                    </a:p>
+                  </a:txBody>
+                  <a:tcPr/>
+                </a:tc>
+                <a:tc>
+                  <a:txBody>
+                    <a:bodyPr/>
+                    <a:p>
+                      <a:pPr algn="ctr">
+                        <a:buNone/>
+                      </a:pPr>
+                      <a:r>
+                        <a:rPr lang="en-US"/>
+                        <a:t>0.05</a:t>
+                      </a:r>
+                      <a:endParaRPr lang="en-US"/>
+                    </a:p>
+                  </a:txBody>
+                  <a:tcPr/>
+                </a:tc>
+                <a:tc>
+                  <a:txBody>
+                    <a:bodyPr/>
+                    <a:p>
+                      <a:pPr algn="ctr">
+                        <a:buNone/>
+                      </a:pPr>
+                      <a:r>
+                        <a:rPr lang="en-US"/>
+                        <a:t>-</a:t>
+                      </a:r>
+                      <a:endParaRPr lang="en-US"/>
+                    </a:p>
+                  </a:txBody>
+                  <a:tcPr/>
+                </a:tc>
+              </a:tr>
+            </a:tbl>
+          </a:graphicData>
+        </a:graphic>
+      </p:graphicFrame>
+      <p:sp>
+        <p:nvSpPr>
+          <p:cNvPr id="3" name="Text Box 2"/>
+          <p:cNvSpPr txBox="true"/>
+          <p:nvPr/>
+        </p:nvSpPr>
+        <p:spPr>
+          <a:xfrm>
+            <a:off x="1746885" y="1402080"/>
+            <a:ext cx="8698865" cy="783590"/>
+          </a:xfrm>
+          <a:prstGeom prst="rect">
+            <a:avLst/>
+          </a:prstGeom>
+          <a:noFill/>
+        </p:spPr>
+        <p:txBody>
+          <a:bodyPr wrap="none" rtlCol="0">
+            <a:spAutoFit/>
+          </a:bodyPr>
+          <a:p>
+            <a:r>
+              <a:rPr lang="zh-CN" altLang="en-US"/>
+              <a:t>假设空间：</a:t>
+            </a:r>
+            <a:r>
+              <a:rPr lang="en-US" altLang="zh-CN"/>
+              <a:t>Θ={{</a:t>
+            </a:r>
+            <a:r>
+              <a:rPr lang="zh-CN" altLang="en-US"/>
+              <a:t>本</a:t>
+            </a:r>
+            <a:r>
+              <a:rPr lang="en-US" altLang="zh-CN"/>
+              <a:t>}</a:t>
+            </a:r>
+            <a:r>
+              <a:rPr lang="zh-CN" altLang="en-US"/>
+              <a:t>，</a:t>
+            </a:r>
+            <a:r>
+              <a:rPr lang="en-US" altLang="zh-CN"/>
+              <a:t>{</a:t>
+            </a:r>
+            <a:r>
+              <a:rPr lang="zh-CN" altLang="en-US"/>
+              <a:t>萨</a:t>
+            </a:r>
+            <a:r>
+              <a:rPr lang="en-US" altLang="zh-CN"/>
+              <a:t>}</a:t>
+            </a:r>
+            <a:r>
+              <a:rPr lang="zh-CN" altLang="en-US"/>
+              <a:t>，</a:t>
+            </a:r>
+            <a:r>
+              <a:rPr lang="en-US" altLang="zh-CN"/>
+              <a:t>{</a:t>
+            </a:r>
+            <a:r>
+              <a:rPr lang="zh-CN" altLang="en-US"/>
+              <a:t>霍</a:t>
+            </a:r>
+            <a:r>
+              <a:rPr lang="en-US" altLang="zh-CN"/>
+              <a:t>}</a:t>
+            </a:r>
+            <a:r>
+              <a:rPr lang="zh-CN" altLang="en-US"/>
+              <a:t>，</a:t>
+            </a:r>
+            <a:r>
+              <a:rPr lang="en-US" altLang="zh-CN"/>
+              <a:t>{</a:t>
+            </a:r>
+            <a:r>
+              <a:rPr lang="zh-CN" altLang="en-US"/>
+              <a:t>本，萨</a:t>
+            </a:r>
+            <a:r>
+              <a:rPr lang="en-US" altLang="zh-CN"/>
+              <a:t>}</a:t>
+            </a:r>
+            <a:r>
+              <a:rPr lang="zh-CN" altLang="en-US"/>
+              <a:t>，</a:t>
+            </a:r>
+            <a:r>
+              <a:rPr lang="en-US" altLang="zh-CN"/>
+              <a:t>{</a:t>
+            </a:r>
+            <a:r>
+              <a:rPr lang="zh-CN" altLang="en-US"/>
+              <a:t>本，霍</a:t>
+            </a:r>
+            <a:r>
+              <a:rPr lang="en-US" altLang="zh-CN"/>
+              <a:t>}</a:t>
+            </a:r>
+            <a:r>
+              <a:rPr lang="zh-CN" altLang="en-US"/>
+              <a:t>，</a:t>
+            </a:r>
+            <a:r>
+              <a:rPr lang="en-US" altLang="zh-CN"/>
+              <a:t>{</a:t>
+            </a:r>
+            <a:r>
+              <a:rPr lang="zh-CN" altLang="en-US"/>
+              <a:t>萨，霍</a:t>
+            </a:r>
+            <a:r>
+              <a:rPr lang="en-US" altLang="zh-CN"/>
+              <a:t>}</a:t>
+            </a:r>
+            <a:r>
+              <a:rPr lang="zh-CN" altLang="en-US"/>
+              <a:t>，</a:t>
+            </a:r>
+            <a:r>
+              <a:rPr lang="en-US" altLang="zh-CN"/>
+              <a:t>{</a:t>
+            </a:r>
+            <a:r>
+              <a:rPr lang="zh-CN" altLang="en-US"/>
+              <a:t>本，萨，霍</a:t>
+            </a:r>
+            <a:r>
+              <a:rPr lang="en-US" altLang="zh-CN"/>
+              <a:t>}}</a:t>
+            </a:r>
+            <a:endParaRPr lang="en-US" altLang="zh-CN"/>
+          </a:p>
+          <a:p>
+            <a:pPr fontAlgn="auto">
+              <a:lnSpc>
+                <a:spcPct val="150000"/>
+              </a:lnSpc>
+            </a:pPr>
+            <a:r>
+              <a:rPr lang="zh-CN" altLang="en-US"/>
+              <a:t>令</a:t>
+            </a:r>
+            <a:r>
+              <a:rPr lang="en-US" altLang="zh-CN"/>
+              <a:t>A={</a:t>
+            </a:r>
+            <a:r>
+              <a:rPr lang="zh-CN" altLang="en-US"/>
+              <a:t>本，萨</a:t>
+            </a:r>
+            <a:r>
+              <a:rPr lang="en-US" altLang="zh-CN"/>
+              <a:t>}</a:t>
+            </a:r>
+            <a:r>
+              <a:rPr lang="zh-CN" altLang="en-US"/>
+              <a:t>，</a:t>
+            </a:r>
+            <a:r>
+              <a:rPr lang="en-US" altLang="zh-CN"/>
+              <a:t>B</a:t>
+            </a:r>
+            <a:r>
+              <a:rPr lang="zh-CN" altLang="en-US"/>
+              <a:t>为</a:t>
+            </a:r>
+            <a:r>
+              <a:rPr lang="en-US" altLang="zh-CN"/>
+              <a:t>A</a:t>
+            </a:r>
+            <a:r>
+              <a:rPr lang="zh-CN" altLang="en-US"/>
+              <a:t>的子集事件，</a:t>
+            </a:r>
+            <a:r>
+              <a:rPr lang="en-US" altLang="zh-CN"/>
+              <a:t>C</a:t>
+            </a:r>
+            <a:r>
+              <a:rPr lang="zh-CN" altLang="en-US"/>
+              <a:t>为</a:t>
+            </a:r>
+            <a:r>
+              <a:rPr lang="en-US" altLang="zh-CN"/>
+              <a:t>A</a:t>
+            </a:r>
+            <a:r>
+              <a:rPr lang="zh-CN" altLang="en-US"/>
+              <a:t>的关联事件</a:t>
+            </a:r>
+            <a:endParaRPr lang="zh-CN" altLang="en-US"/>
+          </a:p>
+        </p:txBody>
+      </p:sp>
+      <p:sp>
+        <p:nvSpPr>
+          <p:cNvPr id="4" name="Text Box 3"/>
+          <p:cNvSpPr txBox="true"/>
+          <p:nvPr/>
+        </p:nvSpPr>
+        <p:spPr>
+          <a:xfrm>
+            <a:off x="5028565" y="974090"/>
+            <a:ext cx="2134870" cy="368300"/>
+          </a:xfrm>
+          <a:prstGeom prst="rect">
+            <a:avLst/>
+          </a:prstGeom>
+          <a:noFill/>
+        </p:spPr>
+        <p:txBody>
+          <a:bodyPr wrap="none" rtlCol="0" anchor="t">
+            <a:spAutoFit/>
+          </a:bodyPr>
+          <a:p>
+            <a:r>
+              <a:rPr lang="zh-CN" altLang="en-US" b="1">
+                <a:sym typeface="+mn-ea"/>
+              </a:rPr>
+              <a:t>事件：</a:t>
+            </a:r>
+            <a:r>
+              <a:rPr lang="en-US" altLang="zh-CN" b="1">
+                <a:sym typeface="+mn-ea"/>
+              </a:rPr>
+              <a:t>911</a:t>
+            </a:r>
+            <a:r>
+              <a:rPr lang="zh-CN" altLang="en-US" b="1">
+                <a:sym typeface="+mn-ea"/>
+              </a:rPr>
+              <a:t>事件元凶</a:t>
+            </a:r>
+            <a:endParaRPr lang="en-US" b="1"/>
+          </a:p>
+        </p:txBody>
+      </p:sp>
+      <p:grpSp>
+        <p:nvGrpSpPr>
+          <p:cNvPr id="7" name="Group 6"/>
+          <p:cNvGrpSpPr/>
+          <p:nvPr/>
+        </p:nvGrpSpPr>
+        <p:grpSpPr>
+          <a:xfrm>
+            <a:off x="5104130" y="2638425"/>
+            <a:ext cx="855345" cy="2264410"/>
+            <a:chOff x="6376" y="4222"/>
+            <a:chExt cx="1347" cy="3566"/>
+          </a:xfrm>
+        </p:grpSpPr>
+        <p:sp>
+          <p:nvSpPr>
+            <p:cNvPr id="5" name="Rectangle 4"/>
+            <p:cNvSpPr/>
+            <p:nvPr/>
+          </p:nvSpPr>
+          <p:spPr>
+            <a:xfrm>
+              <a:off x="6376" y="4222"/>
+              <a:ext cx="1262" cy="3566"/>
+            </a:xfrm>
+            <a:prstGeom prst="rect">
+              <a:avLst/>
+            </a:prstGeom>
+            <a:solidFill>
+              <a:schemeClr val="accent6">
+                <a:alpha val="56000"/>
+              </a:schemeClr>
+            </a:solidFill>
+            <a:ln>
+              <a:noFill/>
+            </a:ln>
+          </p:spPr>
+          <p:style>
+            <a:lnRef idx="2">
+              <a:schemeClr val="accent6"/>
+            </a:lnRef>
+            <a:fillRef idx="1">
+              <a:schemeClr val="lt1"/>
+            </a:fillRef>
+            <a:effectRef idx="0">
+              <a:schemeClr val="accent6"/>
+            </a:effectRef>
+            <a:fontRef idx="minor">
+              <a:schemeClr val="dk1"/>
+            </a:fontRef>
+          </p:style>
+          <p:txBody>
+            <a:bodyPr rtlCol="0" anchor="ctr"/>
+            <a:p>
+              <a:pPr algn="ctr"/>
+              <a:endParaRPr lang="en-US"/>
+            </a:p>
+          </p:txBody>
+        </p:sp>
+        <p:sp>
+          <p:nvSpPr>
+            <p:cNvPr id="6" name="Text Box 5"/>
+            <p:cNvSpPr txBox="true"/>
+            <p:nvPr/>
+          </p:nvSpPr>
+          <p:spPr>
+            <a:xfrm>
+              <a:off x="6376" y="7305"/>
+              <a:ext cx="1347" cy="483"/>
+            </a:xfrm>
+            <a:prstGeom prst="rect">
+              <a:avLst/>
+            </a:prstGeom>
+            <a:noFill/>
+          </p:spPr>
+          <p:txBody>
+            <a:bodyPr wrap="none" rtlCol="0">
+              <a:spAutoFit/>
+            </a:bodyPr>
+            <a:p>
+              <a:r>
+                <a:rPr lang="en-US" sz="1400"/>
+                <a:t>mass</a:t>
+              </a:r>
+              <a:r>
+                <a:rPr lang="en-US" sz="1400" baseline="-25000"/>
+                <a:t>CIA</a:t>
+              </a:r>
+              <a:r>
+                <a:rPr lang="en-US" sz="1400"/>
+                <a:t>()</a:t>
+              </a:r>
+              <a:endParaRPr lang="en-US" sz="1400"/>
+            </a:p>
+          </p:txBody>
+        </p:sp>
+      </p:grpSp>
+      <p:grpSp>
+        <p:nvGrpSpPr>
+          <p:cNvPr id="8" name="Group 7"/>
+          <p:cNvGrpSpPr/>
+          <p:nvPr/>
+        </p:nvGrpSpPr>
+        <p:grpSpPr>
+          <a:xfrm>
+            <a:off x="6099175" y="2638425"/>
+            <a:ext cx="836295" cy="2264410"/>
+            <a:chOff x="6376" y="4222"/>
+            <a:chExt cx="1317" cy="3566"/>
+          </a:xfrm>
+        </p:grpSpPr>
+        <p:sp>
+          <p:nvSpPr>
+            <p:cNvPr id="9" name="Rectangle 8"/>
+            <p:cNvSpPr/>
+            <p:nvPr/>
+          </p:nvSpPr>
+          <p:spPr>
+            <a:xfrm>
+              <a:off x="6376" y="4222"/>
+              <a:ext cx="1262" cy="3566"/>
+            </a:xfrm>
+            <a:prstGeom prst="rect">
+              <a:avLst/>
+            </a:prstGeom>
+            <a:solidFill>
+              <a:schemeClr val="accent6">
+                <a:alpha val="56000"/>
+              </a:schemeClr>
+            </a:solidFill>
+            <a:ln>
+              <a:noFill/>
+            </a:ln>
+          </p:spPr>
+          <p:style>
+            <a:lnRef idx="2">
+              <a:schemeClr val="accent6"/>
+            </a:lnRef>
+            <a:fillRef idx="1">
+              <a:schemeClr val="lt1"/>
+            </a:fillRef>
+            <a:effectRef idx="0">
+              <a:schemeClr val="accent6"/>
+            </a:effectRef>
+            <a:fontRef idx="minor">
+              <a:schemeClr val="dk1"/>
+            </a:fontRef>
+          </p:style>
+          <p:txBody>
+            <a:bodyPr rtlCol="0" anchor="ctr"/>
+            <a:p>
+              <a:pPr algn="ctr"/>
+              <a:endParaRPr lang="en-US"/>
+            </a:p>
+          </p:txBody>
+        </p:sp>
+        <p:sp>
+          <p:nvSpPr>
+            <p:cNvPr id="10" name="Text Box 9"/>
+            <p:cNvSpPr txBox="true"/>
+            <p:nvPr/>
+          </p:nvSpPr>
+          <p:spPr>
+            <a:xfrm>
+              <a:off x="6376" y="7305"/>
+              <a:ext cx="1317" cy="483"/>
+            </a:xfrm>
+            <a:prstGeom prst="rect">
+              <a:avLst/>
+            </a:prstGeom>
+            <a:noFill/>
+          </p:spPr>
+          <p:txBody>
+            <a:bodyPr wrap="none" rtlCol="0">
+              <a:spAutoFit/>
+            </a:bodyPr>
+            <a:p>
+              <a:r>
+                <a:rPr lang="en-US" sz="1400"/>
+                <a:t>mass</a:t>
+              </a:r>
+              <a:r>
+                <a:rPr lang="en-US" sz="1400" baseline="-25000"/>
+                <a:t>FBI</a:t>
+              </a:r>
+              <a:r>
+                <a:rPr lang="en-US" sz="1400"/>
+                <a:t>()</a:t>
+              </a:r>
+              <a:endParaRPr lang="en-US" sz="1400"/>
+            </a:p>
+          </p:txBody>
+        </p:sp>
+      </p:grpSp>
     </p:spTree>
   </p:cSld>
   <p:clrMapOvr>

</xml_diff>